<commit_message>
DEF CON changes to FdPoison, Overlapping and Unlink
</commit_message>
<xml_diff>
--- a/modules/fd_poison/FdPoison.pptx
+++ b/modules/fd_poison/FdPoison.pptx
@@ -20252,7 +20252,7 @@
           <a:p>
             <a:fld id="{2DA23E8D-1792-1541-9147-970A8DD8A355}" type="datetimeFigureOut">
               <a:rPr lang="en-US" smtClean="0"/>
-              <a:t>7/24/21</a:t>
+              <a:t>7/28/21</a:t>
             </a:fld>
             <a:endParaRPr lang="en-US" dirty="0"/>
           </a:p>
@@ -20738,7 +20738,24 @@
           <a:bodyPr/>
           <a:lstStyle/>
           <a:p>
-            <a:endParaRPr lang="en-US" dirty="0"/>
+            <a:r>
+              <a:rPr lang="en-US" dirty="0"/>
+              <a:t>More slides explaining how this works, if you’re interested!</a:t>
+            </a:r>
+          </a:p>
+          <a:p>
+            <a:r>
+              <a:rPr lang="en-US" dirty="0"/>
+              <a:t>Furthermore, the exercise you just did has a variant with </a:t>
+            </a:r>
+            <a:r>
+              <a:rPr lang="en-US" dirty="0" err="1"/>
+              <a:t>GLibC</a:t>
+            </a:r>
+            <a:r>
+              <a:rPr lang="en-US" dirty="0"/>
+              <a:t> 2.32 if you want to try that as well. </a:t>
+            </a:r>
           </a:p>
         </p:txBody>
       </p:sp>
@@ -20759,7 +20776,7 @@
           <a:p>
             <a:fld id="{AC55928C-CD14-454C-B617-1AFCF9A58596}" type="slidenum">
               <a:rPr lang="en-US" smtClean="0"/>
-              <a:t>59</a:t>
+              <a:t>57</a:t>
             </a:fld>
             <a:endParaRPr lang="en-US" dirty="0"/>
           </a:p>
@@ -20768,7 +20785,7 @@
     </p:spTree>
     <p:extLst>
       <p:ext uri="{BB962C8B-B14F-4D97-AF65-F5344CB8AC3E}">
-        <p14:creationId xmlns:p14="http://schemas.microsoft.com/office/powerpoint/2010/main" val="1401829117"/>
+        <p14:creationId xmlns:p14="http://schemas.microsoft.com/office/powerpoint/2010/main" val="1521932623"/>
       </p:ext>
     </p:extLst>
   </p:cSld>
@@ -20843,7 +20860,7 @@
           <a:p>
             <a:fld id="{AC55928C-CD14-454C-B617-1AFCF9A58596}" type="slidenum">
               <a:rPr lang="en-US" smtClean="0"/>
-              <a:t>60</a:t>
+              <a:t>59</a:t>
             </a:fld>
             <a:endParaRPr lang="en-US" dirty="0"/>
           </a:p>
@@ -20852,7 +20869,7 @@
     </p:spTree>
     <p:extLst>
       <p:ext uri="{BB962C8B-B14F-4D97-AF65-F5344CB8AC3E}">
-        <p14:creationId xmlns:p14="http://schemas.microsoft.com/office/powerpoint/2010/main" val="4215730037"/>
+        <p14:creationId xmlns:p14="http://schemas.microsoft.com/office/powerpoint/2010/main" val="1401829117"/>
       </p:ext>
     </p:extLst>
   </p:cSld>
@@ -20927,7 +20944,7 @@
           <a:p>
             <a:fld id="{AC55928C-CD14-454C-B617-1AFCF9A58596}" type="slidenum">
               <a:rPr lang="en-US" smtClean="0"/>
-              <a:t>61</a:t>
+              <a:t>60</a:t>
             </a:fld>
             <a:endParaRPr lang="en-US" dirty="0"/>
           </a:p>
@@ -20936,7 +20953,7 @@
     </p:spTree>
     <p:extLst>
       <p:ext uri="{BB962C8B-B14F-4D97-AF65-F5344CB8AC3E}">
-        <p14:creationId xmlns:p14="http://schemas.microsoft.com/office/powerpoint/2010/main" val="516268333"/>
+        <p14:creationId xmlns:p14="http://schemas.microsoft.com/office/powerpoint/2010/main" val="4215730037"/>
       </p:ext>
     </p:extLst>
   </p:cSld>
@@ -21011,6 +21028,90 @@
           <a:p>
             <a:fld id="{AC55928C-CD14-454C-B617-1AFCF9A58596}" type="slidenum">
               <a:rPr lang="en-US" smtClean="0"/>
+              <a:t>61</a:t>
+            </a:fld>
+            <a:endParaRPr lang="en-US" dirty="0"/>
+          </a:p>
+        </p:txBody>
+      </p:sp>
+    </p:spTree>
+    <p:extLst>
+      <p:ext uri="{BB962C8B-B14F-4D97-AF65-F5344CB8AC3E}">
+        <p14:creationId xmlns:p14="http://schemas.microsoft.com/office/powerpoint/2010/main" val="516268333"/>
+      </p:ext>
+    </p:extLst>
+  </p:cSld>
+  <p:clrMapOvr>
+    <a:masterClrMapping/>
+  </p:clrMapOvr>
+</p:notes>
+</file>
+
+<file path=ppt/notesSlides/notesSlide7.xml><?xml version="1.0" encoding="utf-8"?>
+<p:notes xmlns:a="http://schemas.openxmlformats.org/drawingml/2006/main" xmlns:r="http://schemas.openxmlformats.org/officeDocument/2006/relationships" xmlns:p="http://schemas.openxmlformats.org/presentationml/2006/main">
+  <p:cSld>
+    <p:spTree>
+      <p:nvGrpSpPr>
+        <p:cNvPr id="1" name=""/>
+        <p:cNvGrpSpPr/>
+        <p:nvPr/>
+      </p:nvGrpSpPr>
+      <p:grpSpPr>
+        <a:xfrm>
+          <a:off x="0" y="0"/>
+          <a:ext cx="0" cy="0"/>
+          <a:chOff x="0" y="0"/>
+          <a:chExt cx="0" cy="0"/>
+        </a:xfrm>
+      </p:grpSpPr>
+      <p:sp>
+        <p:nvSpPr>
+          <p:cNvPr id="2" name="Slide Image Placeholder 1"/>
+          <p:cNvSpPr>
+            <a:spLocks noGrp="1" noRot="1" noChangeAspect="1"/>
+          </p:cNvSpPr>
+          <p:nvPr>
+            <p:ph type="sldImg"/>
+          </p:nvPr>
+        </p:nvSpPr>
+        <p:spPr/>
+      </p:sp>
+      <p:sp>
+        <p:nvSpPr>
+          <p:cNvPr id="3" name="Notes Placeholder 2"/>
+          <p:cNvSpPr>
+            <a:spLocks noGrp="1"/>
+          </p:cNvSpPr>
+          <p:nvPr>
+            <p:ph type="body" idx="1"/>
+          </p:nvPr>
+        </p:nvSpPr>
+        <p:spPr/>
+        <p:txBody>
+          <a:bodyPr/>
+          <a:lstStyle/>
+          <a:p>
+            <a:endParaRPr lang="en-US" dirty="0"/>
+          </a:p>
+        </p:txBody>
+      </p:sp>
+      <p:sp>
+        <p:nvSpPr>
+          <p:cNvPr id="4" name="Slide Number Placeholder 3"/>
+          <p:cNvSpPr>
+            <a:spLocks noGrp="1"/>
+          </p:cNvSpPr>
+          <p:nvPr>
+            <p:ph type="sldNum" sz="quarter" idx="5"/>
+          </p:nvPr>
+        </p:nvSpPr>
+        <p:spPr/>
+        <p:txBody>
+          <a:bodyPr/>
+          <a:lstStyle/>
+          <a:p>
+            <a:fld id="{AC55928C-CD14-454C-B617-1AFCF9A58596}" type="slidenum">
+              <a:rPr lang="en-US" smtClean="0"/>
               <a:t>63</a:t>
             </a:fld>
             <a:endParaRPr lang="en-US" dirty="0"/>
@@ -21030,7 +21131,7 @@
 </p:notes>
 </file>
 
-<file path=ppt/notesSlides/notesSlide7.xml><?xml version="1.0" encoding="utf-8"?>
+<file path=ppt/notesSlides/notesSlide8.xml><?xml version="1.0" encoding="utf-8"?>
 <p:notes xmlns:a="http://schemas.openxmlformats.org/drawingml/2006/main" xmlns:r="http://schemas.openxmlformats.org/officeDocument/2006/relationships" xmlns:p="http://schemas.openxmlformats.org/presentationml/2006/main">
   <p:cSld>
     <p:spTree>
@@ -21317,7 +21418,7 @@
                 <a:latin typeface="Calibri"/>
               </a:rPr>
               <a:pPr/>
-              <a:t>7/24/21</a:t>
+              <a:t>7/28/21</a:t>
             </a:fld>
             <a:endParaRPr lang="en-US" dirty="0">
               <a:solidFill>
@@ -21570,7 +21671,7 @@
                 <a:latin typeface="Calibri"/>
               </a:rPr>
               <a:pPr/>
-              <a:t>7/24/21</a:t>
+              <a:t>7/28/21</a:t>
             </a:fld>
             <a:endParaRPr lang="en-US" dirty="0">
               <a:solidFill>
@@ -21785,7 +21886,7 @@
                 <a:latin typeface="Calibri"/>
               </a:rPr>
               <a:pPr/>
-              <a:t>7/24/21</a:t>
+              <a:t>7/28/21</a:t>
             </a:fld>
             <a:endParaRPr lang="en-US" dirty="0">
               <a:solidFill>
@@ -22183,7 +22284,7 @@
                 <a:latin typeface="Calibri"/>
               </a:rPr>
               <a:pPr/>
-              <a:t>7/24/21</a:t>
+              <a:t>7/28/21</a:t>
             </a:fld>
             <a:endParaRPr lang="en-US" dirty="0">
               <a:solidFill>
@@ -22525,7 +22626,7 @@
                 <a:latin typeface="Calibri"/>
               </a:rPr>
               <a:pPr/>
-              <a:t>7/24/21</a:t>
+              <a:t>7/28/21</a:t>
             </a:fld>
             <a:endParaRPr lang="en-US" dirty="0">
               <a:solidFill>
@@ -22853,7 +22954,7 @@
                 <a:latin typeface="Calibri"/>
               </a:rPr>
               <a:pPr/>
-              <a:t>7/24/21</a:t>
+              <a:t>7/28/21</a:t>
             </a:fld>
             <a:endParaRPr lang="en-US" dirty="0">
               <a:solidFill>
@@ -23342,7 +23443,7 @@
                 <a:latin typeface="Calibri"/>
               </a:rPr>
               <a:pPr/>
-              <a:t>7/24/21</a:t>
+              <a:t>7/28/21</a:t>
             </a:fld>
             <a:endParaRPr lang="en-US" dirty="0">
               <a:solidFill>
@@ -23525,7 +23626,7 @@
                 <a:latin typeface="Calibri"/>
               </a:rPr>
               <a:pPr/>
-              <a:t>7/24/21</a:t>
+              <a:t>7/28/21</a:t>
             </a:fld>
             <a:endParaRPr lang="en-US" dirty="0">
               <a:solidFill>
@@ -23771,7 +23872,7 @@
                 <a:latin typeface="Calibri"/>
               </a:rPr>
               <a:pPr/>
-              <a:t>7/24/21</a:t>
+              <a:t>7/28/21</a:t>
             </a:fld>
             <a:endParaRPr lang="en-US" dirty="0">
               <a:solidFill>
@@ -24113,7 +24214,7 @@
                 <a:latin typeface="Calibri"/>
               </a:rPr>
               <a:pPr/>
-              <a:t>7/24/21</a:t>
+              <a:t>7/28/21</a:t>
             </a:fld>
             <a:endParaRPr lang="en-US" dirty="0">
               <a:solidFill>
@@ -24405,7 +24506,7 @@
                 <a:latin typeface="Calibri"/>
               </a:rPr>
               <a:pPr/>
-              <a:t>7/24/21</a:t>
+              <a:t>7/28/21</a:t>
             </a:fld>
             <a:endParaRPr lang="en-US" dirty="0">
               <a:solidFill>
@@ -24655,7 +24756,7 @@
                 <a:latin typeface="Calibri"/>
               </a:rPr>
               <a:pPr defTabSz="914400"/>
-              <a:t>7/24/21</a:t>
+              <a:t>7/28/21</a:t>
             </a:fld>
             <a:endParaRPr lang="en-US" dirty="0">
               <a:solidFill>
@@ -25573,7 +25674,7 @@
             <a:pPr lvl="1"/>
             <a:r>
               <a:rPr lang="en-US" dirty="0"/>
-              <a:t>Fixed in 2.32 (more later)</a:t>
+              <a:t>Fixed in 2.32 </a:t>
             </a:r>
           </a:p>
           <a:p>
@@ -27950,7 +28051,7 @@
           <a:p>
             <a:r>
               <a:rPr lang="en-US" dirty="0"/>
-              <a:t>Challenge 1</a:t>
+              <a:t>Exercise 1</a:t>
             </a:r>
           </a:p>
         </p:txBody>
@@ -28662,7 +28763,7 @@
             </a:r>
             <a:r>
               <a:rPr lang="en-US" b="1" dirty="0"/>
-              <a:t>0x601080</a:t>
+              <a:t>﻿0x404060</a:t>
             </a:r>
           </a:p>
           <a:p>
@@ -29440,7 +29541,7 @@
 </file>
 
 <file path=ppt/slides/slide31.xml><?xml version="1.0" encoding="utf-8"?>
-<p:sld xmlns:a="http://schemas.openxmlformats.org/drawingml/2006/main" xmlns:r="http://schemas.openxmlformats.org/officeDocument/2006/relationships" xmlns:p="http://schemas.openxmlformats.org/presentationml/2006/main" show="0">
+<p:sld xmlns:a="http://schemas.openxmlformats.org/drawingml/2006/main" xmlns:r="http://schemas.openxmlformats.org/officeDocument/2006/relationships" xmlns:p="http://schemas.openxmlformats.org/presentationml/2006/main">
   <p:cSld>
     <p:spTree>
       <p:nvGrpSpPr>
@@ -29657,7 +29758,7 @@
 </file>
 
 <file path=ppt/slides/slide32.xml><?xml version="1.0" encoding="utf-8"?>
-<p:sld xmlns:a="http://schemas.openxmlformats.org/drawingml/2006/main" xmlns:r="http://schemas.openxmlformats.org/officeDocument/2006/relationships" xmlns:p="http://schemas.openxmlformats.org/presentationml/2006/main" show="0">
+<p:sld xmlns:a="http://schemas.openxmlformats.org/drawingml/2006/main" xmlns:r="http://schemas.openxmlformats.org/officeDocument/2006/relationships" xmlns:p="http://schemas.openxmlformats.org/presentationml/2006/main">
   <p:cSld>
     <p:spTree>
       <p:nvGrpSpPr>
@@ -33691,7 +33792,7 @@
 </file>
 
 <file path=ppt/slides/slide50.xml><?xml version="1.0" encoding="utf-8"?>
-<p:sld xmlns:a="http://schemas.openxmlformats.org/drawingml/2006/main" xmlns:r="http://schemas.openxmlformats.org/officeDocument/2006/relationships" xmlns:p="http://schemas.openxmlformats.org/presentationml/2006/main" show="0">
+<p:sld xmlns:a="http://schemas.openxmlformats.org/drawingml/2006/main" xmlns:r="http://schemas.openxmlformats.org/officeDocument/2006/relationships" xmlns:p="http://schemas.openxmlformats.org/presentationml/2006/main">
   <p:cSld>
     <p:spTree>
       <p:nvGrpSpPr>
@@ -37223,15 +37324,6 @@
           <a:solidFill>
             <a:srgbClr val="FFFFFF"/>
           </a:solidFill>
-          <a:extLst>
-            <a:ext uri="{909E8E84-426E-40DD-AFC4-6F175D3DCCD1}">
-              <a14:hiddenFill xmlns:a14="http://schemas.microsoft.com/office/drawing/2010/main">
-                <a:solidFill>
-                  <a:srgbClr val="FFFFFF"/>
-                </a:solidFill>
-              </a14:hiddenFill>
-            </a:ext>
-          </a:extLst>
         </p:spPr>
       </p:pic>
     </p:spTree>

</xml_diff>

<commit_message>
Small changes to the solutions
</commit_message>
<xml_diff>
--- a/modules/fd_poison/FdPoison.pptx
+++ b/modules/fd_poison/FdPoison.pptx
@@ -20252,7 +20252,7 @@
           <a:p>
             <a:fld id="{2DA23E8D-1792-1541-9147-970A8DD8A355}" type="datetimeFigureOut">
               <a:rPr lang="en-US" smtClean="0"/>
-              <a:t>7/28/21</a:t>
+              <a:t>7/29/21</a:t>
             </a:fld>
             <a:endParaRPr lang="en-US" dirty="0"/>
           </a:p>
@@ -21418,7 +21418,7 @@
                 <a:latin typeface="Calibri"/>
               </a:rPr>
               <a:pPr/>
-              <a:t>7/28/21</a:t>
+              <a:t>7/29/21</a:t>
             </a:fld>
             <a:endParaRPr lang="en-US" dirty="0">
               <a:solidFill>
@@ -21671,7 +21671,7 @@
                 <a:latin typeface="Calibri"/>
               </a:rPr>
               <a:pPr/>
-              <a:t>7/28/21</a:t>
+              <a:t>7/29/21</a:t>
             </a:fld>
             <a:endParaRPr lang="en-US" dirty="0">
               <a:solidFill>
@@ -21886,7 +21886,7 @@
                 <a:latin typeface="Calibri"/>
               </a:rPr>
               <a:pPr/>
-              <a:t>7/28/21</a:t>
+              <a:t>7/29/21</a:t>
             </a:fld>
             <a:endParaRPr lang="en-US" dirty="0">
               <a:solidFill>
@@ -22284,7 +22284,7 @@
                 <a:latin typeface="Calibri"/>
               </a:rPr>
               <a:pPr/>
-              <a:t>7/28/21</a:t>
+              <a:t>7/29/21</a:t>
             </a:fld>
             <a:endParaRPr lang="en-US" dirty="0">
               <a:solidFill>
@@ -22626,7 +22626,7 @@
                 <a:latin typeface="Calibri"/>
               </a:rPr>
               <a:pPr/>
-              <a:t>7/28/21</a:t>
+              <a:t>7/29/21</a:t>
             </a:fld>
             <a:endParaRPr lang="en-US" dirty="0">
               <a:solidFill>
@@ -22954,7 +22954,7 @@
                 <a:latin typeface="Calibri"/>
               </a:rPr>
               <a:pPr/>
-              <a:t>7/28/21</a:t>
+              <a:t>7/29/21</a:t>
             </a:fld>
             <a:endParaRPr lang="en-US" dirty="0">
               <a:solidFill>
@@ -23443,7 +23443,7 @@
                 <a:latin typeface="Calibri"/>
               </a:rPr>
               <a:pPr/>
-              <a:t>7/28/21</a:t>
+              <a:t>7/29/21</a:t>
             </a:fld>
             <a:endParaRPr lang="en-US" dirty="0">
               <a:solidFill>
@@ -23626,7 +23626,7 @@
                 <a:latin typeface="Calibri"/>
               </a:rPr>
               <a:pPr/>
-              <a:t>7/28/21</a:t>
+              <a:t>7/29/21</a:t>
             </a:fld>
             <a:endParaRPr lang="en-US" dirty="0">
               <a:solidFill>
@@ -23872,7 +23872,7 @@
                 <a:latin typeface="Calibri"/>
               </a:rPr>
               <a:pPr/>
-              <a:t>7/28/21</a:t>
+              <a:t>7/29/21</a:t>
             </a:fld>
             <a:endParaRPr lang="en-US" dirty="0">
               <a:solidFill>
@@ -24214,7 +24214,7 @@
                 <a:latin typeface="Calibri"/>
               </a:rPr>
               <a:pPr/>
-              <a:t>7/28/21</a:t>
+              <a:t>7/29/21</a:t>
             </a:fld>
             <a:endParaRPr lang="en-US" dirty="0">
               <a:solidFill>
@@ -24506,7 +24506,7 @@
                 <a:latin typeface="Calibri"/>
               </a:rPr>
               <a:pPr/>
-              <a:t>7/28/21</a:t>
+              <a:t>7/29/21</a:t>
             </a:fld>
             <a:endParaRPr lang="en-US" dirty="0">
               <a:solidFill>
@@ -24756,7 +24756,7 @@
                 <a:latin typeface="Calibri"/>
               </a:rPr>
               <a:pPr defTabSz="914400"/>
-              <a:t>7/28/21</a:t>
+              <a:t>7/29/21</a:t>
             </a:fld>
             <a:endParaRPr lang="en-US" dirty="0">
               <a:solidFill>
@@ -44668,7 +44668,7 @@
           <a:p>
             <a:r>
               <a:rPr lang="en-US" sz="3200" dirty="0"/>
-              <a:t>0x601080</a:t>
+              <a:t>0x404060</a:t>
             </a:r>
           </a:p>
         </p:txBody>
@@ -44704,7 +44704,7 @@
             <a:pPr algn="r"/>
             <a:r>
               <a:rPr lang="en-US" sz="3200" dirty="0"/>
-              <a:t>﻿0x602 = 0x6022a0 </a:t>
+              <a:t>﻿0x602 = ﻿0x6022a0 </a:t>
             </a:r>
             <a:r>
               <a:rPr lang="en-US" sz="4000" b="1" dirty="0"/>
@@ -45005,7 +45005,7 @@
           <a:p>
             <a:r>
               <a:rPr lang="en-US" sz="3200" dirty="0"/>
-              <a:t>0x601080</a:t>
+              <a:t>﻿0x404060</a:t>
             </a:r>
           </a:p>
         </p:txBody>
@@ -45111,7 +45111,7 @@
           <a:p>
             <a:r>
               <a:rPr lang="en-US" sz="3200" dirty="0"/>
-              <a:t> = ﻿ ﻿0x601682</a:t>
+              <a:t> = ﻿ ﻿﻿0x404662</a:t>
             </a:r>
           </a:p>
         </p:txBody>

</xml_diff>

<commit_message>
Touch up slide changes
* Add cheatsheet
* Add ending slides to overlapping chunks
</commit_message>
<xml_diff>
--- a/modules/fd_poison/FdPoison.pptx
+++ b/modules/fd_poison/FdPoison.pptx
@@ -6205,8 +6205,8 @@
   <dgm:cxnLst>
     <dgm:cxn modelId="{5916F715-C6AE-4260-94E1-34DF03CF2100}" srcId="{0B2F6741-0639-4C8D-8A3C-FFD75182C2F3}" destId="{95B41571-F7CC-437A-BF86-AD6EDAA1A9AF}" srcOrd="1" destOrd="0" parTransId="{281E6ADE-8A9D-4CEA-9EA6-DE87C063F946}" sibTransId="{7EE362A6-6E87-4211-B03E-E0A5A8EE4F63}"/>
     <dgm:cxn modelId="{7E22902C-B00B-A54A-825C-4F3625EB3958}" type="presOf" srcId="{95B41571-F7CC-437A-BF86-AD6EDAA1A9AF}" destId="{7EF7E994-0E42-7245-8F68-8C621C965746}" srcOrd="0" destOrd="0" presId="urn:microsoft.com/office/officeart/2005/8/layout/vList5"/>
+    <dgm:cxn modelId="{8B35475F-8F65-461E-849E-855A58559B3C}" srcId="{0B2F6741-0639-4C8D-8A3C-FFD75182C2F3}" destId="{80007F94-0B13-4679-80EB-91B45408B134}" srcOrd="0" destOrd="0" parTransId="{41410B20-4C67-4978-9E1B-1D0D7B19DC04}" sibTransId="{2D96A349-7AF2-4C05-BE91-A394EFB3EFF5}"/>
     <dgm:cxn modelId="{30308844-1CA6-B94E-95D7-CFFCDC76F7F9}" type="presOf" srcId="{0B2F6741-0639-4C8D-8A3C-FFD75182C2F3}" destId="{1784B921-3EC5-A049-A9D2-ACFEAFE61F2F}" srcOrd="0" destOrd="0" presId="urn:microsoft.com/office/officeart/2005/8/layout/vList5"/>
-    <dgm:cxn modelId="{8B35475F-8F65-461E-849E-855A58559B3C}" srcId="{0B2F6741-0639-4C8D-8A3C-FFD75182C2F3}" destId="{80007F94-0B13-4679-80EB-91B45408B134}" srcOrd="0" destOrd="0" parTransId="{41410B20-4C67-4978-9E1B-1D0D7B19DC04}" sibTransId="{2D96A349-7AF2-4C05-BE91-A394EFB3EFF5}"/>
     <dgm:cxn modelId="{4F9080EA-9D54-014D-A973-8CFABAC1A389}" type="presOf" srcId="{80007F94-0B13-4679-80EB-91B45408B134}" destId="{9E420BE3-1A04-6A41-A1D1-FE93DA4AB7FC}" srcOrd="0" destOrd="0" presId="urn:microsoft.com/office/officeart/2005/8/layout/vList5"/>
     <dgm:cxn modelId="{46E1AC1C-4662-E048-8AD5-48CD55A9F3A9}" type="presParOf" srcId="{1784B921-3EC5-A049-A9D2-ACFEAFE61F2F}" destId="{3FAACD5C-5268-C443-A65D-142714DDFB5C}" srcOrd="0" destOrd="0" presId="urn:microsoft.com/office/officeart/2005/8/layout/vList5"/>
     <dgm:cxn modelId="{8C1E15A0-7336-8D4B-AD15-B36F45405BCD}" type="presParOf" srcId="{3FAACD5C-5268-C443-A65D-142714DDFB5C}" destId="{9E420BE3-1A04-6A41-A1D1-FE93DA4AB7FC}" srcOrd="0" destOrd="0" presId="urn:microsoft.com/office/officeart/2005/8/layout/vList5"/>
@@ -7925,9 +7925,9 @@
   <dgm:cxnLst>
     <dgm:cxn modelId="{FCEEC821-C1B8-499B-96B5-F2CC985ACFE6}" srcId="{8AB19AA1-3799-4371-BB38-2D0C5E8C2A45}" destId="{56B374C1-A832-416C-8E0D-05F412F01D30}" srcOrd="1" destOrd="0" parTransId="{E4048F7F-ECA6-4B13-B839-7D81136FBCD8}" sibTransId="{2A44419F-C103-42C0-A429-720AEADCB687}"/>
     <dgm:cxn modelId="{9D4C8032-8770-4F32-8890-4E82B517C816}" type="presOf" srcId="{9577AF12-DAED-4E4C-8A6F-84E4E6DD52C0}" destId="{05E2BC93-5380-4F0C-8E93-C3ABB51219B6}" srcOrd="0" destOrd="0" presId="urn:microsoft.com/office/officeart/2018/2/layout/IconVerticalSolidList"/>
-    <dgm:cxn modelId="{2A923F47-A1D3-4AA3-BD6E-D831C9E7D5D3}" srcId="{E1066DE9-C192-48DA-B7CF-38916483B7F3}" destId="{E94EC189-C7E2-4FC2-8194-981ACD4C2C12}" srcOrd="3" destOrd="0" parTransId="{2B3C5B11-DCF0-4B33-BDA6-F7449F7024D3}" sibTransId="{43B59569-2E8E-43C0-8AE7-2499055B7AFD}"/>
     <dgm:cxn modelId="{0AF54A5B-6B68-48C9-AE57-2042346D373A}" type="presOf" srcId="{8AB19AA1-3799-4371-BB38-2D0C5E8C2A45}" destId="{5D529BBD-14A4-47E3-ACFC-C7AA915D8DB0}" srcOrd="0" destOrd="0" presId="urn:microsoft.com/office/officeart/2018/2/layout/IconVerticalSolidList"/>
     <dgm:cxn modelId="{F2A8BD61-5461-408D-A8AD-0DD7D3FA1FAC}" srcId="{E1066DE9-C192-48DA-B7CF-38916483B7F3}" destId="{556A6198-39BF-4E34-9917-79D3CF610B31}" srcOrd="2" destOrd="0" parTransId="{3C8B98C1-83E8-43C9-8190-DCE1D08C9E5F}" sibTransId="{4B841D10-4B22-4E99-9241-3FC95E9CCCB0}"/>
+    <dgm:cxn modelId="{2A923F47-A1D3-4AA3-BD6E-D831C9E7D5D3}" srcId="{E1066DE9-C192-48DA-B7CF-38916483B7F3}" destId="{E94EC189-C7E2-4FC2-8194-981ACD4C2C12}" srcOrd="3" destOrd="0" parTransId="{2B3C5B11-DCF0-4B33-BDA6-F7449F7024D3}" sibTransId="{43B59569-2E8E-43C0-8AE7-2499055B7AFD}"/>
     <dgm:cxn modelId="{81690D6D-E313-4EEA-80B1-043005038AE7}" type="presOf" srcId="{556A6198-39BF-4E34-9917-79D3CF610B31}" destId="{5FC8BE61-F47C-47BA-971A-3FEB867F9B89}" srcOrd="0" destOrd="0" presId="urn:microsoft.com/office/officeart/2018/2/layout/IconVerticalSolidList"/>
     <dgm:cxn modelId="{37AF2890-28E3-48E4-ABFA-40E1A96F815C}" type="presOf" srcId="{B71EE0E0-E1B6-4A40-9EC7-BB09587185E0}" destId="{0E52705C-FCA3-49BC-82F3-A4F61AF1714F}" srcOrd="0" destOrd="0" presId="urn:microsoft.com/office/officeart/2018/2/layout/IconVerticalSolidList"/>
     <dgm:cxn modelId="{F32A3CA0-83DE-421C-8B94-8B18B492C5D9}" type="presOf" srcId="{56B374C1-A832-416C-8E0D-05F412F01D30}" destId="{0E52705C-FCA3-49BC-82F3-A4F61AF1714F}" srcOrd="0" destOrd="1" presId="urn:microsoft.com/office/officeart/2018/2/layout/IconVerticalSolidList"/>
@@ -20252,7 +20252,7 @@
           <a:p>
             <a:fld id="{2DA23E8D-1792-1541-9147-970A8DD8A355}" type="datetimeFigureOut">
               <a:rPr lang="en-US" smtClean="0"/>
-              <a:t>7/29/21</a:t>
+              <a:t>7/30/2021</a:t>
             </a:fld>
             <a:endParaRPr lang="en-US" dirty="0"/>
           </a:p>
@@ -21418,7 +21418,7 @@
                 <a:latin typeface="Calibri"/>
               </a:rPr>
               <a:pPr/>
-              <a:t>7/29/21</a:t>
+              <a:t>7/30/2021</a:t>
             </a:fld>
             <a:endParaRPr lang="en-US" dirty="0">
               <a:solidFill>
@@ -21671,7 +21671,7 @@
                 <a:latin typeface="Calibri"/>
               </a:rPr>
               <a:pPr/>
-              <a:t>7/29/21</a:t>
+              <a:t>7/30/2021</a:t>
             </a:fld>
             <a:endParaRPr lang="en-US" dirty="0">
               <a:solidFill>
@@ -21886,7 +21886,7 @@
                 <a:latin typeface="Calibri"/>
               </a:rPr>
               <a:pPr/>
-              <a:t>7/29/21</a:t>
+              <a:t>7/30/2021</a:t>
             </a:fld>
             <a:endParaRPr lang="en-US" dirty="0">
               <a:solidFill>
@@ -22284,7 +22284,7 @@
                 <a:latin typeface="Calibri"/>
               </a:rPr>
               <a:pPr/>
-              <a:t>7/29/21</a:t>
+              <a:t>7/30/2021</a:t>
             </a:fld>
             <a:endParaRPr lang="en-US" dirty="0">
               <a:solidFill>
@@ -22626,7 +22626,7 @@
                 <a:latin typeface="Calibri"/>
               </a:rPr>
               <a:pPr/>
-              <a:t>7/29/21</a:t>
+              <a:t>7/30/2021</a:t>
             </a:fld>
             <a:endParaRPr lang="en-US" dirty="0">
               <a:solidFill>
@@ -22954,7 +22954,7 @@
                 <a:latin typeface="Calibri"/>
               </a:rPr>
               <a:pPr/>
-              <a:t>7/29/21</a:t>
+              <a:t>7/30/2021</a:t>
             </a:fld>
             <a:endParaRPr lang="en-US" dirty="0">
               <a:solidFill>
@@ -23443,7 +23443,7 @@
                 <a:latin typeface="Calibri"/>
               </a:rPr>
               <a:pPr/>
-              <a:t>7/29/21</a:t>
+              <a:t>7/30/2021</a:t>
             </a:fld>
             <a:endParaRPr lang="en-US" dirty="0">
               <a:solidFill>
@@ -23626,7 +23626,7 @@
                 <a:latin typeface="Calibri"/>
               </a:rPr>
               <a:pPr/>
-              <a:t>7/29/21</a:t>
+              <a:t>7/30/2021</a:t>
             </a:fld>
             <a:endParaRPr lang="en-US" dirty="0">
               <a:solidFill>
@@ -23872,7 +23872,7 @@
                 <a:latin typeface="Calibri"/>
               </a:rPr>
               <a:pPr/>
-              <a:t>7/29/21</a:t>
+              <a:t>7/30/2021</a:t>
             </a:fld>
             <a:endParaRPr lang="en-US" dirty="0">
               <a:solidFill>
@@ -24214,7 +24214,7 @@
                 <a:latin typeface="Calibri"/>
               </a:rPr>
               <a:pPr/>
-              <a:t>7/29/21</a:t>
+              <a:t>7/30/2021</a:t>
             </a:fld>
             <a:endParaRPr lang="en-US" dirty="0">
               <a:solidFill>
@@ -24506,7 +24506,7 @@
                 <a:latin typeface="Calibri"/>
               </a:rPr>
               <a:pPr/>
-              <a:t>7/29/21</a:t>
+              <a:t>7/30/2021</a:t>
             </a:fld>
             <a:endParaRPr lang="en-US" dirty="0">
               <a:solidFill>
@@ -24756,7 +24756,7 @@
                 <a:latin typeface="Calibri"/>
               </a:rPr>
               <a:pPr defTabSz="914400"/>
-              <a:t>7/29/21</a:t>
+              <a:t>7/30/2021</a:t>
             </a:fld>
             <a:endParaRPr lang="en-US" dirty="0">
               <a:solidFill>
@@ -31413,13 +31413,15 @@
           <a:p>
             <a:r>
               <a:rPr lang="en-US" dirty="0"/>
-              <a:t>Mostly the same as </a:t>
-            </a:r>
-            <a:r>
-              <a:rPr lang="en-US" i="1" dirty="0" err="1"/>
-              <a:t>Fastbin</a:t>
-            </a:r>
-            <a:endParaRPr lang="en-US" dirty="0"/>
+              <a:t>Next: </a:t>
+            </a:r>
+          </a:p>
+          <a:p>
+            <a:pPr lvl="1"/>
+            <a:r>
+              <a:rPr lang="en-US" dirty="0"/>
+              <a:t>Singly linked list pointer</a:t>
+            </a:r>
           </a:p>
           <a:p>
             <a:r>

</xml_diff>